<commit_message>
Adding final presentation. Adding timing, and message replys from Client
</commit_message>
<xml_diff>
--- a/documentation/Final_Presentation.pptx
+++ b/documentation/Final_Presentation.pptx
@@ -15,7 +15,8 @@
     <p:sldId id="262" r:id="rId9"/>
     <p:sldId id="263" r:id="rId10"/>
     <p:sldId id="264" r:id="rId11"/>
-    <p:sldId id="270" r:id="rId12"/>
+    <p:sldId id="272" r:id="rId12"/>
+    <p:sldId id="270" r:id="rId13"/>
   </p:sldIdLst>
   <p:sldSz cx="12192000" cy="6858000"/>
   <p:notesSz cx="6858000" cy="9144000"/>
@@ -8915,7 +8916,7 @@
           <a:p>
             <a:fld id="{4D756BF8-590D-48C2-9A28-1713209B596F}" type="datetimeFigureOut">
               <a:rPr lang="en-US" smtClean="0"/>
-              <a:t>12/2/2024</a:t>
+              <a:t>12/4/2024</a:t>
             </a:fld>
             <a:endParaRPr lang="en-US"/>
           </a:p>
@@ -9122,7 +9123,7 @@
           <a:p>
             <a:fld id="{4D756BF8-590D-48C2-9A28-1713209B596F}" type="datetimeFigureOut">
               <a:rPr lang="en-US" smtClean="0"/>
-              <a:t>12/2/2024</a:t>
+              <a:t>12/4/2024</a:t>
             </a:fld>
             <a:endParaRPr lang="en-US"/>
           </a:p>
@@ -9302,7 +9303,7 @@
           <a:p>
             <a:fld id="{4D756BF8-590D-48C2-9A28-1713209B596F}" type="datetimeFigureOut">
               <a:rPr lang="en-US" smtClean="0"/>
-              <a:t>12/2/2024</a:t>
+              <a:t>12/4/2024</a:t>
             </a:fld>
             <a:endParaRPr lang="en-US"/>
           </a:p>
@@ -9507,7 +9508,7 @@
           <a:p>
             <a:fld id="{4D756BF8-590D-48C2-9A28-1713209B596F}" type="datetimeFigureOut">
               <a:rPr lang="en-US" smtClean="0"/>
-              <a:t>12/2/2024</a:t>
+              <a:t>12/4/2024</a:t>
             </a:fld>
             <a:endParaRPr lang="en-US"/>
           </a:p>
@@ -18405,7 +18406,7 @@
           <a:p>
             <a:fld id="{4D756BF8-590D-48C2-9A28-1713209B596F}" type="datetimeFigureOut">
               <a:rPr lang="en-US" smtClean="0"/>
-              <a:t>12/2/2024</a:t>
+              <a:t>12/4/2024</a:t>
             </a:fld>
             <a:endParaRPr lang="en-US"/>
           </a:p>
@@ -18679,7 +18680,7 @@
           <a:p>
             <a:fld id="{4D756BF8-590D-48C2-9A28-1713209B596F}" type="datetimeFigureOut">
               <a:rPr lang="en-US" smtClean="0"/>
-              <a:t>12/2/2024</a:t>
+              <a:t>12/4/2024</a:t>
             </a:fld>
             <a:endParaRPr lang="en-US"/>
           </a:p>
@@ -19077,7 +19078,7 @@
           <a:p>
             <a:fld id="{4D756BF8-590D-48C2-9A28-1713209B596F}" type="datetimeFigureOut">
               <a:rPr lang="en-US" smtClean="0"/>
-              <a:t>12/2/2024</a:t>
+              <a:t>12/4/2024</a:t>
             </a:fld>
             <a:endParaRPr lang="en-US"/>
           </a:p>
@@ -19195,7 +19196,7 @@
           <a:p>
             <a:fld id="{4D756BF8-590D-48C2-9A28-1713209B596F}" type="datetimeFigureOut">
               <a:rPr lang="en-US" smtClean="0"/>
-              <a:t>12/2/2024</a:t>
+              <a:t>12/4/2024</a:t>
             </a:fld>
             <a:endParaRPr lang="en-US"/>
           </a:p>
@@ -19290,7 +19291,7 @@
           <a:p>
             <a:fld id="{4D756BF8-590D-48C2-9A28-1713209B596F}" type="datetimeFigureOut">
               <a:rPr lang="en-US" smtClean="0"/>
-              <a:t>12/2/2024</a:t>
+              <a:t>12/4/2024</a:t>
             </a:fld>
             <a:endParaRPr lang="en-US"/>
           </a:p>
@@ -19580,7 +19581,7 @@
           <a:p>
             <a:fld id="{4D756BF8-590D-48C2-9A28-1713209B596F}" type="datetimeFigureOut">
               <a:rPr lang="en-US" smtClean="0"/>
-              <a:t>12/2/2024</a:t>
+              <a:t>12/4/2024</a:t>
             </a:fld>
             <a:endParaRPr lang="en-US"/>
           </a:p>
@@ -19860,7 +19861,7 @@
           <a:p>
             <a:fld id="{4D756BF8-590D-48C2-9A28-1713209B596F}" type="datetimeFigureOut">
               <a:rPr lang="en-US" smtClean="0"/>
-              <a:t>12/2/2024</a:t>
+              <a:t>12/4/2024</a:t>
             </a:fld>
             <a:endParaRPr lang="en-US"/>
           </a:p>
@@ -20110,7 +20111,7 @@
           <a:p>
             <a:fld id="{4D756BF8-590D-48C2-9A28-1713209B596F}" type="datetimeFigureOut">
               <a:rPr lang="en-US" smtClean="0"/>
-              <a:t>12/2/2024</a:t>
+              <a:t>12/4/2024</a:t>
             </a:fld>
             <a:endParaRPr lang="en-US"/>
           </a:p>
@@ -20801,6 +20802,203 @@
 </file>
 
 <file path=ppt/slides/slide11.xml><?xml version="1.0" encoding="utf-8"?>
+<p:sld xmlns:a="http://schemas.openxmlformats.org/drawingml/2006/main" xmlns:r="http://schemas.openxmlformats.org/officeDocument/2006/relationships" xmlns:p="http://schemas.openxmlformats.org/presentationml/2006/main">
+  <p:cSld>
+    <p:spTree>
+      <p:nvGrpSpPr>
+        <p:cNvPr id="1" name=""/>
+        <p:cNvGrpSpPr/>
+        <p:nvPr/>
+      </p:nvGrpSpPr>
+      <p:grpSpPr>
+        <a:xfrm>
+          <a:off x="0" y="0"/>
+          <a:ext cx="0" cy="0"/>
+          <a:chOff x="0" y="0"/>
+          <a:chExt cx="0" cy="0"/>
+        </a:xfrm>
+      </p:grpSpPr>
+      <p:sp>
+        <p:nvSpPr>
+          <p:cNvPr id="2" name="Title 1">
+            <a:extLst>
+              <a:ext uri="{FF2B5EF4-FFF2-40B4-BE49-F238E27FC236}">
+                <a16:creationId xmlns:a16="http://schemas.microsoft.com/office/drawing/2014/main" id="{EDC3F2FD-7098-5503-047A-30BF59EFCADC}"/>
+              </a:ext>
+            </a:extLst>
+          </p:cNvPr>
+          <p:cNvSpPr>
+            <a:spLocks noGrp="1"/>
+          </p:cNvSpPr>
+          <p:nvPr>
+            <p:ph type="title"/>
+          </p:nvPr>
+        </p:nvSpPr>
+        <p:spPr/>
+        <p:txBody>
+          <a:bodyPr/>
+          <a:lstStyle/>
+          <a:p>
+            <a:r>
+              <a:rPr lang="en-US" dirty="0"/>
+              <a:t>Parallel Timings</a:t>
+            </a:r>
+          </a:p>
+        </p:txBody>
+      </p:sp>
+      <p:sp>
+        <p:nvSpPr>
+          <p:cNvPr id="3" name="Text Placeholder 2">
+            <a:extLst>
+              <a:ext uri="{FF2B5EF4-FFF2-40B4-BE49-F238E27FC236}">
+                <a16:creationId xmlns:a16="http://schemas.microsoft.com/office/drawing/2014/main" id="{40C9EF66-1FA2-1005-A036-0D0ADF1C9656}"/>
+              </a:ext>
+            </a:extLst>
+          </p:cNvPr>
+          <p:cNvSpPr>
+            <a:spLocks noGrp="1"/>
+          </p:cNvSpPr>
+          <p:nvPr>
+            <p:ph type="body" idx="1"/>
+          </p:nvPr>
+        </p:nvSpPr>
+        <p:spPr/>
+        <p:txBody>
+          <a:bodyPr/>
+          <a:lstStyle/>
+          <a:p>
+            <a:r>
+              <a:rPr lang="en-US" dirty="0"/>
+              <a:t>1 App 4 Stock</a:t>
+            </a:r>
+          </a:p>
+        </p:txBody>
+      </p:sp>
+      <p:sp>
+        <p:nvSpPr>
+          <p:cNvPr id="4" name="Content Placeholder 3">
+            <a:extLst>
+              <a:ext uri="{FF2B5EF4-FFF2-40B4-BE49-F238E27FC236}">
+                <a16:creationId xmlns:a16="http://schemas.microsoft.com/office/drawing/2014/main" id="{84ED6A90-581C-70CC-71D0-3F45764253BA}"/>
+              </a:ext>
+            </a:extLst>
+          </p:cNvPr>
+          <p:cNvSpPr>
+            <a:spLocks noGrp="1"/>
+          </p:cNvSpPr>
+          <p:nvPr>
+            <p:ph sz="half" idx="2"/>
+          </p:nvPr>
+        </p:nvSpPr>
+        <p:spPr/>
+        <p:txBody>
+          <a:bodyPr/>
+          <a:lstStyle/>
+          <a:p>
+            <a:r>
+              <a:rPr lang="en-US" dirty="0"/>
+              <a:t>Download: 8.5 sec</a:t>
+            </a:r>
+          </a:p>
+          <a:p>
+            <a:r>
+              <a:rPr lang="en-US" dirty="0"/>
+              <a:t>Train: 63.2 sec</a:t>
+            </a:r>
+          </a:p>
+          <a:p>
+            <a:r>
+              <a:rPr lang="en-US" dirty="0"/>
+              <a:t>Predict: 34.2 sec</a:t>
+            </a:r>
+          </a:p>
+          <a:p>
+            <a:endParaRPr lang="en-US" dirty="0"/>
+          </a:p>
+        </p:txBody>
+      </p:sp>
+      <p:sp>
+        <p:nvSpPr>
+          <p:cNvPr id="5" name="Text Placeholder 4">
+            <a:extLst>
+              <a:ext uri="{FF2B5EF4-FFF2-40B4-BE49-F238E27FC236}">
+                <a16:creationId xmlns:a16="http://schemas.microsoft.com/office/drawing/2014/main" id="{B72D266E-9027-D121-44DF-96556E6B70B2}"/>
+              </a:ext>
+            </a:extLst>
+          </p:cNvPr>
+          <p:cNvSpPr>
+            <a:spLocks noGrp="1"/>
+          </p:cNvSpPr>
+          <p:nvPr>
+            <p:ph type="body" sz="quarter" idx="3"/>
+          </p:nvPr>
+        </p:nvSpPr>
+        <p:spPr/>
+        <p:txBody>
+          <a:bodyPr/>
+          <a:lstStyle/>
+          <a:p>
+            <a:r>
+              <a:rPr lang="en-US" dirty="0"/>
+              <a:t>4 App 4 Stock</a:t>
+            </a:r>
+          </a:p>
+        </p:txBody>
+      </p:sp>
+      <p:sp>
+        <p:nvSpPr>
+          <p:cNvPr id="6" name="Content Placeholder 5">
+            <a:extLst>
+              <a:ext uri="{FF2B5EF4-FFF2-40B4-BE49-F238E27FC236}">
+                <a16:creationId xmlns:a16="http://schemas.microsoft.com/office/drawing/2014/main" id="{B672CCAC-9935-2CCD-A640-8AC885866B27}"/>
+              </a:ext>
+            </a:extLst>
+          </p:cNvPr>
+          <p:cNvSpPr>
+            <a:spLocks noGrp="1"/>
+          </p:cNvSpPr>
+          <p:nvPr>
+            <p:ph sz="quarter" idx="4"/>
+          </p:nvPr>
+        </p:nvSpPr>
+        <p:spPr/>
+        <p:txBody>
+          <a:bodyPr/>
+          <a:lstStyle/>
+          <a:p>
+            <a:r>
+              <a:rPr lang="en-US" dirty="0"/>
+              <a:t>Download: 2.7 sec (S: 3.1, E: 77.5%)</a:t>
+            </a:r>
+          </a:p>
+          <a:p>
+            <a:r>
+              <a:rPr lang="en-US" dirty="0"/>
+              <a:t>Train: 24.1 sec (S: 2.6, E: 65%)</a:t>
+            </a:r>
+          </a:p>
+          <a:p>
+            <a:r>
+              <a:rPr lang="en-US" dirty="0"/>
+              <a:t>Predict: 11.2 sec (S: 3.02, E: 75%)</a:t>
+            </a:r>
+          </a:p>
+        </p:txBody>
+      </p:sp>
+    </p:spTree>
+    <p:extLst>
+      <p:ext uri="{BB962C8B-B14F-4D97-AF65-F5344CB8AC3E}">
+        <p14:creationId xmlns:p14="http://schemas.microsoft.com/office/powerpoint/2010/main" val="893248925"/>
+      </p:ext>
+    </p:extLst>
+  </p:cSld>
+  <p:clrMapOvr>
+    <a:masterClrMapping/>
+  </p:clrMapOvr>
+</p:sld>
+</file>
+
+<file path=ppt/slides/slide12.xml><?xml version="1.0" encoding="utf-8"?>
 <p:sld xmlns:a="http://schemas.openxmlformats.org/drawingml/2006/main" xmlns:r="http://schemas.openxmlformats.org/officeDocument/2006/relationships" xmlns:p="http://schemas.openxmlformats.org/presentationml/2006/main">
   <p:cSld>
     <p:spTree>

</xml_diff>